<commit_message>
conformance testing pattern (#669)
* conformance testing pattern

* conformance experiment
</commit_message>
<xml_diff>
--- a/mkdocs/docs/images/src/conformance.pptx
+++ b/mkdocs/docs/images/src/conformance.pptx
@@ -197,7 +197,7 @@
           <a:p>
             <a:fld id="{38B78CBE-37FA-D241-BB4C-CAC5D3B25F49}" type="datetimeFigureOut">
               <a:rPr lang="en-US" smtClean="0"/>
-              <a:t>4/28/21</a:t>
+              <a:t>5/6/21</a:t>
             </a:fld>
             <a:endParaRPr lang="en-US"/>
           </a:p>
@@ -611,7 +611,7 @@
           <a:p>
             <a:fld id="{708812C5-0212-FD42-A0D4-E2E8FF4E3AF5}" type="datetime1">
               <a:rPr lang="en-US" smtClean="0"/>
-              <a:t>4/28/21</a:t>
+              <a:t>5/6/21</a:t>
             </a:fld>
             <a:endParaRPr lang="en-US"/>
           </a:p>
@@ -812,7 +812,7 @@
           <a:p>
             <a:fld id="{D232AC6F-41C3-B34B-9BAA-03ED2F3BC0F6}" type="datetime1">
               <a:rPr lang="en-US" smtClean="0"/>
-              <a:t>4/28/21</a:t>
+              <a:t>5/6/21</a:t>
             </a:fld>
             <a:endParaRPr lang="en-US"/>
           </a:p>
@@ -1023,7 +1023,7 @@
           <a:p>
             <a:fld id="{BEE140C2-F440-9D49-95CB-5965D64CC4A2}" type="datetime1">
               <a:rPr lang="en-US" smtClean="0"/>
-              <a:t>4/28/21</a:t>
+              <a:t>5/6/21</a:t>
             </a:fld>
             <a:endParaRPr lang="en-US"/>
           </a:p>
@@ -1224,7 +1224,7 @@
           <a:p>
             <a:fld id="{CC99F980-FB29-FD47-8508-150F73F1E8B0}" type="datetime1">
               <a:rPr lang="en-US" smtClean="0"/>
-              <a:t>4/28/21</a:t>
+              <a:t>5/6/21</a:t>
             </a:fld>
             <a:endParaRPr lang="en-US"/>
           </a:p>
@@ -1502,7 +1502,7 @@
           <a:p>
             <a:fld id="{D4510983-EA22-9643-8AC0-B3C6499B643B}" type="datetime1">
               <a:rPr lang="en-US" smtClean="0"/>
-              <a:t>4/28/21</a:t>
+              <a:t>5/6/21</a:t>
             </a:fld>
             <a:endParaRPr lang="en-US"/>
           </a:p>
@@ -1770,7 +1770,7 @@
           <a:p>
             <a:fld id="{D5A39195-967D-5D4E-8C6A-C99866996458}" type="datetime1">
               <a:rPr lang="en-US" smtClean="0"/>
-              <a:t>4/28/21</a:t>
+              <a:t>5/6/21</a:t>
             </a:fld>
             <a:endParaRPr lang="en-US"/>
           </a:p>
@@ -2185,7 +2185,7 @@
           <a:p>
             <a:fld id="{5AD771E9-C79D-684D-A158-5EB6E92DE947}" type="datetime1">
               <a:rPr lang="en-US" smtClean="0"/>
-              <a:t>4/28/21</a:t>
+              <a:t>5/6/21</a:t>
             </a:fld>
             <a:endParaRPr lang="en-US"/>
           </a:p>
@@ -2329,7 +2329,7 @@
           <a:p>
             <a:fld id="{693CA161-7E4C-5C4B-B799-DB602A0B9806}" type="datetime1">
               <a:rPr lang="en-US" smtClean="0"/>
-              <a:t>4/28/21</a:t>
+              <a:t>5/6/21</a:t>
             </a:fld>
             <a:endParaRPr lang="en-US"/>
           </a:p>
@@ -2445,7 +2445,7 @@
           <a:p>
             <a:fld id="{6D55FDF3-8BB2-6349-A5FA-057F3D78953D}" type="datetime1">
               <a:rPr lang="en-US" smtClean="0"/>
-              <a:t>4/28/21</a:t>
+              <a:t>5/6/21</a:t>
             </a:fld>
             <a:endParaRPr lang="en-US"/>
           </a:p>
@@ -2759,7 +2759,7 @@
           <a:p>
             <a:fld id="{EEDFACC0-3228-BA4B-942E-CEF38B0101FD}" type="datetime1">
               <a:rPr lang="en-US" smtClean="0"/>
-              <a:t>4/28/21</a:t>
+              <a:t>5/6/21</a:t>
             </a:fld>
             <a:endParaRPr lang="en-US"/>
           </a:p>
@@ -3050,7 +3050,7 @@
           <a:p>
             <a:fld id="{07EEEDBE-E24C-D140-B419-6D8D592D0F1C}" type="datetime1">
               <a:rPr lang="en-US" smtClean="0"/>
-              <a:t>4/28/21</a:t>
+              <a:t>5/6/21</a:t>
             </a:fld>
             <a:endParaRPr lang="en-US"/>
           </a:p>
@@ -3294,7 +3294,7 @@
           <a:p>
             <a:fld id="{E05781A2-A5EF-C54C-A3EF-F62483D37EDC}" type="datetime1">
               <a:rPr lang="en-US" smtClean="0"/>
-              <a:t>4/28/21</a:t>
+              <a:t>5/6/21</a:t>
             </a:fld>
             <a:endParaRPr lang="en-US"/>
           </a:p>
@@ -7029,7 +7029,7 @@
         <p:spPr>
           <a:xfrm>
             <a:off x="9754998" y="2869010"/>
-            <a:ext cx="1184427" cy="369332"/>
+            <a:ext cx="634276" cy="369332"/>
           </a:xfrm>
           <a:prstGeom prst="rect">
             <a:avLst/>
@@ -7060,7 +7060,7 @@
               <a:defRPr/>
             </a:pPr>
             <a:r>
-              <a:rPr kumimoji="0" lang="en-US" sz="1800" b="1" i="0" u="none" strike="noStrike" kern="1200" cap="none" spc="0" normalizeH="0" baseline="0" noProof="0" dirty="0">
+              <a:rPr kumimoji="0" lang="en-US" sz="1800" b="1" i="0" u="none" strike="noStrike" kern="1200" cap="none" spc="0" normalizeH="0" baseline="0" noProof="0">
                 <a:ln>
                   <a:noFill/>
                 </a:ln>
@@ -7074,8 +7074,22 @@
                 <a:ea typeface="+mn-ea"/>
                 <a:cs typeface="+mn-cs"/>
               </a:rPr>
-              <a:t>Objectives</a:t>
-            </a:r>
+              <a:t>SLOs</a:t>
+            </a:r>
+            <a:endParaRPr kumimoji="0" lang="en-US" sz="1800" b="1" i="0" u="none" strike="noStrike" kern="1200" cap="none" spc="0" normalizeH="0" baseline="0" noProof="0" dirty="0">
+              <a:ln>
+                <a:noFill/>
+              </a:ln>
+              <a:solidFill>
+                <a:srgbClr val="C00000"/>
+              </a:solidFill>
+              <a:effectLst/>
+              <a:uLnTx/>
+              <a:uFillTx/>
+              <a:latin typeface="Calibri" panose="020F0502020204030204"/>
+              <a:ea typeface="+mn-ea"/>
+              <a:cs typeface="+mn-cs"/>
+            </a:endParaRPr>
           </a:p>
         </p:txBody>
       </p:sp>

</xml_diff>